<commit_message>
Final copy of presentation
</commit_message>
<xml_diff>
--- a/Documents/Final Presentation.pptx
+++ b/Documents/Final Presentation.pptx
@@ -5,7 +5,7 @@
     <p:sldMasterId id="2147483660" r:id="rId1"/>
   </p:sldMasterIdLst>
   <p:notesMasterIdLst>
-    <p:notesMasterId r:id="rId20"/>
+    <p:notesMasterId r:id="rId21"/>
   </p:notesMasterIdLst>
   <p:sldIdLst>
     <p:sldId id="256" r:id="rId2"/>
@@ -26,6 +26,7 @@
     <p:sldId id="283" r:id="rId17"/>
     <p:sldId id="284" r:id="rId18"/>
     <p:sldId id="285" r:id="rId19"/>
+    <p:sldId id="286" r:id="rId20"/>
   </p:sldIdLst>
   <p:sldSz cx="9144000" cy="6858000" type="screen4x3"/>
   <p:notesSz cx="6858000" cy="9144000"/>
@@ -4912,7 +4913,7 @@
         <p:spPr/>
         <p:txBody>
           <a:bodyPr>
-            <a:normAutofit fontScale="77500" lnSpcReduction="20000"/>
+            <a:normAutofit/>
           </a:bodyPr>
           <a:lstStyle/>
           <a:p>
@@ -4932,68 +4933,44 @@
               <a:t>                                                                                                                 </a:t>
             </a:r>
             <a:r>
-              <a:rPr lang="en-US" sz="2300" b="1" dirty="0" smtClean="0"/>
+              <a:rPr lang="en-US" sz="2400" dirty="0" smtClean="0"/>
               <a:t>1: </a:t>
             </a:r>
             <a:r>
               <a:rPr lang="en-US" sz="2300" dirty="0" smtClean="0"/>
-              <a:t>[[</a:t>
+              <a:t>[58.0</a:t>
             </a:r>
             <a:r>
               <a:rPr lang="en-US" sz="2300" dirty="0"/>
-              <a:t>63.75916230366492, 25.59738219895288, 4.737696335078534, 35.24376752046357, 18.071460634995603, 5.451047541570147], </a:t>
+              <a:t>, 24.0, 3.0, </a:t>
             </a:r>
             <a:r>
               <a:rPr lang="en-US" sz="2300" dirty="0" smtClean="0"/>
-              <a:t>             </a:t>
-            </a:r>
-            <a:r>
-              <a:rPr lang="en-US" sz="2300" b="1" dirty="0" smtClean="0"/>
-              <a:t>2: </a:t>
+              <a:t>35.24, 18.07, 5.45], </a:t>
+            </a:r>
+          </a:p>
+          <a:p>
+            <a:pPr marL="0" indent="0">
+              <a:lnSpc>
+                <a:spcPct val="150000"/>
+              </a:lnSpc>
+              <a:buNone/>
+            </a:pPr>
+            <a:r>
+              <a:rPr lang="en-US" sz="2300" dirty="0"/>
+              <a:t> </a:t>
             </a:r>
             <a:r>
               <a:rPr lang="en-US" sz="2300" dirty="0" smtClean="0"/>
-              <a:t>[63.75916230366492</a:t>
+              <a:t>      2: [253.0</a:t>
             </a:r>
             <a:r>
               <a:rPr lang="en-US" sz="2300" dirty="0"/>
-              <a:t>, 25.59738219895288, 4.737696335078534, 35.24376752046357, 18.071460634995603, 5.451047541570147], </a:t>
+              <a:t>, 254.0, 251.0, </a:t>
             </a:r>
             <a:r>
               <a:rPr lang="en-US" sz="2300" dirty="0" smtClean="0"/>
-              <a:t>             </a:t>
-            </a:r>
-            <a:r>
-              <a:rPr lang="en-US" sz="2300" b="1" dirty="0" smtClean="0"/>
-              <a:t>3: </a:t>
-            </a:r>
-            <a:r>
-              <a:rPr lang="en-US" sz="2300" dirty="0" smtClean="0"/>
-              <a:t>[252.4709480122324</a:t>
-            </a:r>
-            <a:r>
-              <a:rPr lang="en-US" sz="2300" dirty="0"/>
-              <a:t>, 252.70489296636086, 243.44724770642202, 2.868405350395589, 3.2287991970079113, 23.802374410824587], </a:t>
-            </a:r>
-            <a:r>
-              <a:rPr lang="en-US" sz="2300" dirty="0" smtClean="0"/>
-              <a:t>            </a:t>
-            </a:r>
-            <a:r>
-              <a:rPr lang="en-US" sz="2300" b="1" dirty="0" smtClean="0"/>
-              <a:t>4: </a:t>
-            </a:r>
-            <a:r>
-              <a:rPr lang="en-US" sz="2300" dirty="0" smtClean="0"/>
-              <a:t>[63.75916230366492</a:t>
-            </a:r>
-            <a:r>
-              <a:rPr lang="en-US" sz="2300" dirty="0"/>
-              <a:t>, 25.59738219895288, 4.737696335078534, 35.24376752046357, 18.071460634995603, 5.451047541570147</a:t>
-            </a:r>
-            <a:r>
-              <a:rPr lang="en-US" sz="2300" dirty="0" smtClean="0"/>
-              <a:t>]…</a:t>
+              <a:t>2.86, 3.22, 23.80]…</a:t>
             </a:r>
             <a:endParaRPr lang="en-US" sz="2300" dirty="0"/>
           </a:p>
@@ -5129,11 +5106,7 @@
             </a:pPr>
             <a:r>
               <a:rPr lang="en-US" sz="2400" dirty="0" smtClean="0"/>
-              <a:t> These </a:t>
-            </a:r>
-            <a:r>
-              <a:rPr lang="en-US" sz="2400" dirty="0" smtClean="0"/>
-              <a:t>feature vectors describe the categories of classification. For e.g. the tag “sky” will have a feature vector associated with it, which will numerically represent it</a:t>
+              <a:t> These feature vectors describe the categories of classification. For e.g. the tag “sky” will have a feature vector associated with it, which will numerically represent it</a:t>
             </a:r>
           </a:p>
           <a:p>
@@ -5458,13 +5431,13 @@
         </p:spPr>
         <p:txBody>
           <a:bodyPr>
-            <a:normAutofit fontScale="90000"/>
+            <a:normAutofit/>
           </a:bodyPr>
           <a:lstStyle/>
           <a:p>
             <a:r>
               <a:rPr lang="en-US" dirty="0" smtClean="0"/>
-              <a:t>Overall Process of Machine Learning</a:t>
+              <a:t>Machine Learning Process</a:t>
             </a:r>
             <a:endParaRPr lang="en-US" dirty="0"/>
           </a:p>
@@ -5498,8 +5471,9 @@
             </a:pPr>
             <a:r>
               <a:rPr lang="en-US" dirty="0" smtClean="0"/>
-              <a:t>This type of classification is based on feature vectors generated by processing  the segments in each image</a:t>
-            </a:r>
+              <a:t>Classification based on feature vectors generated from image processing</a:t>
+            </a:r>
+            <a:endParaRPr lang="en-US" dirty="0" smtClean="0"/>
           </a:p>
           <a:p>
             <a:pPr marL="251460" indent="-342900">
@@ -5508,7 +5482,15 @@
             </a:pPr>
             <a:r>
               <a:rPr lang="en-US" dirty="0" smtClean="0"/>
-              <a:t>The feature vector we used is a 6-D vector of numerical values representing a segment of an image</a:t>
+              <a:t>6-D feature vectors associated with an </a:t>
+            </a:r>
+            <a:r>
+              <a:rPr lang="en-US" dirty="0" smtClean="0"/>
+              <a:t>image </a:t>
+            </a:r>
+            <a:r>
+              <a:rPr lang="en-US" dirty="0"/>
+              <a:t>tag, e.g. “sky”</a:t>
             </a:r>
           </a:p>
           <a:p>
@@ -5518,8 +5500,9 @@
             </a:pPr>
             <a:r>
               <a:rPr lang="en-US" dirty="0" smtClean="0"/>
-              <a:t>Each vector is associated with an image tag, e.g. “sky”</a:t>
-            </a:r>
+              <a:t>Model is fit to the labelled feature vectors (hyperplanes used to create model)</a:t>
+            </a:r>
+            <a:endParaRPr lang="en-US" dirty="0" smtClean="0"/>
           </a:p>
           <a:p>
             <a:pPr marL="251460" indent="-342900">
@@ -5528,8 +5511,9 @@
             </a:pPr>
             <a:r>
               <a:rPr lang="en-US" dirty="0" smtClean="0"/>
-              <a:t>Using the feature vectors along with the labels for each tag, a machine learning model was created (this is where the hyperplane comes into the picture)</a:t>
-            </a:r>
+              <a:t>Model is then used to classify features in new images</a:t>
+            </a:r>
+            <a:endParaRPr lang="en-US" dirty="0" smtClean="0"/>
           </a:p>
           <a:p>
             <a:pPr marL="251460" indent="-342900">
@@ -5538,7 +5522,15 @@
             </a:pPr>
             <a:r>
               <a:rPr lang="en-US" dirty="0" smtClean="0"/>
-              <a:t>This model was then used to predict what things the new image contains</a:t>
+              <a:t>The SVM </a:t>
+            </a:r>
+            <a:r>
+              <a:rPr lang="en-US" dirty="0" smtClean="0"/>
+              <a:t>provides </a:t>
+            </a:r>
+            <a:r>
+              <a:rPr lang="en-US" dirty="0" smtClean="0"/>
+              <a:t>tags and probabilities associated with each tag</a:t>
             </a:r>
           </a:p>
           <a:p>
@@ -5548,17 +5540,7 @@
             </a:pPr>
             <a:r>
               <a:rPr lang="en-US" dirty="0" smtClean="0"/>
-              <a:t>The SVM provided tags and probabilities associated with each tag</a:t>
-            </a:r>
-          </a:p>
-          <a:p>
-            <a:pPr marL="251460" indent="-342900">
-              <a:buFont typeface="Wingdings" panose="05000000000000000000" pitchFamily="2" charset="2"/>
-              <a:buChar char="v"/>
-            </a:pPr>
-            <a:r>
-              <a:rPr lang="en-US" dirty="0" smtClean="0"/>
-              <a:t>We used the SVM library provided by </a:t>
+              <a:t>The SVM library in the </a:t>
             </a:r>
             <a:r>
               <a:rPr lang="en-US" dirty="0" err="1" smtClean="0"/>
@@ -5566,8 +5548,9 @@
             </a:r>
             <a:r>
               <a:rPr lang="en-US" dirty="0" smtClean="0"/>
-              <a:t>-learn</a:t>
-            </a:r>
+              <a:t>-learn module was used</a:t>
+            </a:r>
+            <a:endParaRPr lang="en-US" dirty="0" smtClean="0"/>
           </a:p>
         </p:txBody>
       </p:sp>
@@ -5802,21 +5785,8 @@
             </a:pPr>
             <a:r>
               <a:rPr lang="en-US" sz="2400" dirty="0" smtClean="0"/>
-              <a:t> </a:t>
-            </a:r>
-            <a:r>
-              <a:rPr lang="en-US" sz="2400" dirty="0" smtClean="0"/>
-              <a:t>Very limited </a:t>
-            </a:r>
-            <a:r>
-              <a:rPr lang="en-US" sz="2400" dirty="0" smtClean="0"/>
-              <a:t>in what kinds of things it can detect. Most of our training data consisted of outdoor images, so the classifier detects sky, water, grass, trees, etc. better than other </a:t>
-            </a:r>
-            <a:r>
-              <a:rPr lang="en-US" sz="2400" dirty="0" smtClean="0"/>
-              <a:t>things</a:t>
-            </a:r>
-            <a:endParaRPr lang="en-US" sz="2400" dirty="0" smtClean="0"/>
+              <a:t> Very limited in what kinds of things it can detect. Most of our training data consisted of outdoor images, so the classifier detects sky, water, grass, trees, etc. better than other things</a:t>
+            </a:r>
           </a:p>
           <a:p>
             <a:pPr>
@@ -5825,11 +5795,27 @@
             </a:pPr>
             <a:r>
               <a:rPr lang="en-US" sz="2400" dirty="0" smtClean="0"/>
-              <a:t> Since the training set was very small, the classification is very limited, and the accuracy is not very high </a:t>
+              <a:t> Since the training set was </a:t>
             </a:r>
             <a:r>
               <a:rPr lang="en-US" sz="2400" dirty="0" smtClean="0"/>
-              <a:t>either</a:t>
+              <a:t>small</a:t>
+            </a:r>
+            <a:r>
+              <a:rPr lang="en-US" sz="2400" dirty="0" smtClean="0"/>
+              <a:t>, the classification is </a:t>
+            </a:r>
+            <a:r>
+              <a:rPr lang="en-US" sz="2400" dirty="0" smtClean="0"/>
+              <a:t>limited</a:t>
+            </a:r>
+            <a:r>
+              <a:rPr lang="en-US" sz="2400" dirty="0" smtClean="0"/>
+              <a:t>, and the accuracy is </a:t>
+            </a:r>
+            <a:r>
+              <a:rPr lang="en-US" sz="2400" dirty="0" smtClean="0"/>
+              <a:t>low</a:t>
             </a:r>
             <a:endParaRPr lang="en-US" sz="2400" dirty="0" smtClean="0"/>
           </a:p>
@@ -5840,11 +5826,11 @@
             </a:pPr>
             <a:r>
               <a:rPr lang="en-US" sz="2400" dirty="0" smtClean="0"/>
-              <a:t> The classification is color based, and shape is not taken into consideration. This sometimes results in erroneous classification for things that are similar in </a:t>
+              <a:t> </a:t>
             </a:r>
             <a:r>
               <a:rPr lang="en-US" sz="2400" dirty="0" smtClean="0"/>
-              <a:t>color</a:t>
+              <a:t>Similarly colored objects can be erroneously tagged because the algorithm is almost purely color based</a:t>
             </a:r>
             <a:endParaRPr lang="en-US" sz="2400" dirty="0" smtClean="0"/>
           </a:p>
@@ -5916,7 +5902,7 @@
         <p:spPr/>
         <p:txBody>
           <a:bodyPr>
-            <a:normAutofit/>
+            <a:normAutofit lnSpcReduction="10000"/>
           </a:bodyPr>
           <a:lstStyle/>
           <a:p>
@@ -5935,12 +5921,8 @@
               <a:buChar char="v"/>
             </a:pPr>
             <a:r>
-              <a:rPr lang="en-US" sz="2400" dirty="0"/>
-              <a:t> </a:t>
-            </a:r>
-            <a:r>
               <a:rPr lang="en-US" sz="2400" dirty="0" smtClean="0"/>
-              <a:t>Even with lots of tools available, there is still a lot of work that needs to be done to make a good classifier</a:t>
+              <a:t> Even with extensive libraries available, a lot of work must be done to create an accurate classifier</a:t>
             </a:r>
           </a:p>
           <a:p>
@@ -5949,24 +5931,12 @@
               <a:buChar char="v"/>
             </a:pPr>
             <a:r>
+              <a:rPr lang="en-US" sz="2400" dirty="0"/>
+              <a:t> </a:t>
+            </a:r>
+            <a:r>
               <a:rPr lang="en-US" sz="2400" dirty="0" smtClean="0"/>
-              <a:t> Future work – generate better </a:t>
-            </a:r>
-            <a:r>
-              <a:rPr lang="en-US" sz="2400" dirty="0"/>
-              <a:t>feature vectors by </a:t>
-            </a:r>
-            <a:r>
-              <a:rPr lang="en-US" sz="2400" dirty="0" smtClean="0"/>
-              <a:t>investigating </a:t>
-            </a:r>
-            <a:r>
-              <a:rPr lang="en-US" sz="2400" dirty="0"/>
-              <a:t>different factors to form the basis for </a:t>
-            </a:r>
-            <a:r>
-              <a:rPr lang="en-US" sz="2400" dirty="0" smtClean="0"/>
-              <a:t>them</a:t>
+              <a:t>Image segmentation needs to be tuned separately for training and classification.</a:t>
             </a:r>
           </a:p>
           <a:p>
@@ -5975,28 +5945,23 @@
               <a:buChar char="v"/>
             </a:pPr>
             <a:r>
+              <a:rPr lang="en-US" sz="2400" dirty="0" smtClean="0"/>
+              <a:t> Better feature vectors must be formed by using other indicators such a shape, global inference, and feature association.</a:t>
+            </a:r>
+            <a:endParaRPr lang="en-US" sz="2400" dirty="0" smtClean="0"/>
+          </a:p>
+          <a:p>
+            <a:pPr>
+              <a:buFont typeface="Wingdings" panose="05000000000000000000" pitchFamily="2" charset="2"/>
+              <a:buChar char="v"/>
+            </a:pPr>
+            <a:r>
               <a:rPr lang="en-US" sz="2400" dirty="0"/>
               <a:t> </a:t>
             </a:r>
             <a:r>
               <a:rPr lang="en-US" sz="2400" dirty="0" smtClean="0"/>
-              <a:t>This would help in classifying </a:t>
-            </a:r>
-            <a:r>
-              <a:rPr lang="en-US" sz="2400" dirty="0"/>
-              <a:t>images with higher accuracy and </a:t>
-            </a:r>
-            <a:r>
-              <a:rPr lang="en-US" sz="2400" dirty="0" smtClean="0"/>
-              <a:t>drawing </a:t>
-            </a:r>
-            <a:r>
-              <a:rPr lang="en-US" sz="2400" dirty="0"/>
-              <a:t>conclusions about relations between various entities within the </a:t>
-            </a:r>
-            <a:r>
-              <a:rPr lang="en-US" sz="2400" dirty="0" smtClean="0"/>
-              <a:t>images</a:t>
+              <a:t>With better quantification of segments in the image a more accurate classifier can be created.</a:t>
             </a:r>
             <a:endParaRPr lang="en-US" sz="2400" dirty="0"/>
           </a:p>
@@ -6006,6 +5971,84 @@
     <p:extLst>
       <p:ext uri="{BB962C8B-B14F-4D97-AF65-F5344CB8AC3E}">
         <p14:creationId xmlns:p14="http://schemas.microsoft.com/office/powerpoint/2010/main" val="799280972"/>
+      </p:ext>
+    </p:extLst>
+  </p:cSld>
+  <p:clrMapOvr>
+    <a:masterClrMapping/>
+  </p:clrMapOvr>
+</p:sld>
+</file>
+
+<file path=ppt/slides/slide19.xml><?xml version="1.0" encoding="utf-8"?>
+<p:sld xmlns:a="http://schemas.openxmlformats.org/drawingml/2006/main" xmlns:r="http://schemas.openxmlformats.org/officeDocument/2006/relationships" xmlns:p="http://schemas.openxmlformats.org/presentationml/2006/main">
+  <p:cSld>
+    <p:spTree>
+      <p:nvGrpSpPr>
+        <p:cNvPr id="1" name=""/>
+        <p:cNvGrpSpPr/>
+        <p:nvPr/>
+      </p:nvGrpSpPr>
+      <p:grpSpPr>
+        <a:xfrm>
+          <a:off x="0" y="0"/>
+          <a:ext cx="0" cy="0"/>
+          <a:chOff x="0" y="0"/>
+          <a:chExt cx="0" cy="0"/>
+        </a:xfrm>
+      </p:grpSpPr>
+      <p:sp>
+        <p:nvSpPr>
+          <p:cNvPr id="2" name="Title 1"/>
+          <p:cNvSpPr>
+            <a:spLocks noGrp="1"/>
+          </p:cNvSpPr>
+          <p:nvPr>
+            <p:ph type="title"/>
+          </p:nvPr>
+        </p:nvSpPr>
+        <p:spPr/>
+        <p:txBody>
+          <a:bodyPr/>
+          <a:lstStyle/>
+          <a:p>
+            <a:endParaRPr lang="en-US"/>
+          </a:p>
+        </p:txBody>
+      </p:sp>
+      <p:pic>
+        <p:nvPicPr>
+          <p:cNvPr id="4" name="Content Placeholder 3"/>
+          <p:cNvPicPr>
+            <a:picLocks noGrp="1" noChangeAspect="1"/>
+          </p:cNvPicPr>
+          <p:nvPr>
+            <p:ph idx="1"/>
+          </p:nvPr>
+        </p:nvPicPr>
+        <p:blipFill>
+          <a:blip r:embed="rId2">
+            <a:extLst>
+              <a:ext uri="{28A0092B-C50C-407E-A947-70E740481C1C}">
+                <a14:useLocalDpi xmlns:a14="http://schemas.microsoft.com/office/drawing/2010/main" val="0"/>
+              </a:ext>
+            </a:extLst>
+          </a:blip>
+          <a:stretch>
+            <a:fillRect/>
+          </a:stretch>
+        </p:blipFill>
+        <p:spPr>
+          <a:xfrm>
+            <a:off x="1" y="0"/>
+            <a:ext cx="9144000" cy="6858000"/>
+          </a:xfrm>
+        </p:spPr>
+      </p:pic>
+    </p:spTree>
+    <p:extLst>
+      <p:ext uri="{BB962C8B-B14F-4D97-AF65-F5344CB8AC3E}">
+        <p14:creationId xmlns:p14="http://schemas.microsoft.com/office/powerpoint/2010/main" val="3931094281"/>
       </p:ext>
     </p:extLst>
   </p:cSld>
@@ -6077,7 +6120,7 @@
         </p:spPr>
         <p:txBody>
           <a:bodyPr>
-            <a:normAutofit fontScale="70000" lnSpcReduction="20000"/>
+            <a:normAutofit fontScale="77500" lnSpcReduction="20000"/>
           </a:bodyPr>
           <a:lstStyle/>
           <a:p>
@@ -6141,7 +6184,21 @@
             </a:pPr>
             <a:r>
               <a:rPr lang="en-US" sz="2600" dirty="0"/>
-              <a:t> DBSCAN</a:t>
+              <a:t> </a:t>
+            </a:r>
+            <a:r>
+              <a:rPr lang="en-US" sz="2600" dirty="0" smtClean="0"/>
+              <a:t>DBSCAN</a:t>
+            </a:r>
+          </a:p>
+          <a:p>
+            <a:pPr>
+              <a:buFont typeface="Wingdings" panose="05000000000000000000" pitchFamily="2" charset="2"/>
+              <a:buChar char="v"/>
+            </a:pPr>
+            <a:r>
+              <a:rPr lang="en-US" sz="2600" dirty="0" smtClean="0"/>
+              <a:t> Machine Learning</a:t>
             </a:r>
           </a:p>
           <a:p>
@@ -6150,8 +6207,22 @@
               <a:buChar char="Ø"/>
             </a:pPr>
             <a:r>
+              <a:rPr lang="en-US" sz="2600" dirty="0" smtClean="0"/>
+              <a:t> </a:t>
+            </a:r>
+            <a:r>
               <a:rPr lang="en-US" sz="2600" dirty="0"/>
-              <a:t> Sobel filtering</a:t>
+              <a:t>GUI</a:t>
+            </a:r>
+          </a:p>
+          <a:p>
+            <a:pPr lvl="1">
+              <a:buFont typeface="Wingdings" panose="05000000000000000000" pitchFamily="2" charset="2"/>
+              <a:buChar char="Ø"/>
+            </a:pPr>
+            <a:r>
+              <a:rPr lang="en-US" sz="2600" dirty="0"/>
+              <a:t> Supervised learning using SVM</a:t>
             </a:r>
           </a:p>
           <a:p>
@@ -6161,27 +6232,7 @@
             </a:pPr>
             <a:r>
               <a:rPr lang="en-US" sz="2600" dirty="0"/>
-              <a:t> Machine Learning</a:t>
-            </a:r>
-          </a:p>
-          <a:p>
-            <a:pPr lvl="1">
-              <a:buFont typeface="Wingdings" panose="05000000000000000000" pitchFamily="2" charset="2"/>
-              <a:buChar char="Ø"/>
-            </a:pPr>
-            <a:r>
-              <a:rPr lang="en-US" sz="2600" dirty="0"/>
-              <a:t> GUI</a:t>
-            </a:r>
-          </a:p>
-          <a:p>
-            <a:pPr lvl="1">
-              <a:buFont typeface="Wingdings" panose="05000000000000000000" pitchFamily="2" charset="2"/>
-              <a:buChar char="Ø"/>
-            </a:pPr>
-            <a:r>
-              <a:rPr lang="en-US" sz="2600" dirty="0"/>
-              <a:t> Supervised learning using SVM</a:t>
+              <a:t> Results</a:t>
             </a:r>
           </a:p>
           <a:p>
@@ -6191,11 +6242,7 @@
             </a:pPr>
             <a:r>
               <a:rPr lang="en-US" sz="2600" dirty="0"/>
-              <a:t> </a:t>
-            </a:r>
-            <a:r>
-              <a:rPr lang="en-US" sz="2600" dirty="0"/>
-              <a:t>Results</a:t>
+              <a:t> Limitations</a:t>
             </a:r>
           </a:p>
           <a:p>
@@ -6205,7 +6252,7 @@
             </a:pPr>
             <a:r>
               <a:rPr lang="en-US" sz="2600" dirty="0"/>
-              <a:t> Limitations</a:t>
+              <a:t> Conclusion and Future Work </a:t>
             </a:r>
           </a:p>
           <a:p>
@@ -6215,19 +6262,8 @@
             </a:pPr>
             <a:r>
               <a:rPr lang="en-US" sz="2600" dirty="0"/>
-              <a:t> Conclusion and Future Work </a:t>
-            </a:r>
-          </a:p>
-          <a:p>
-            <a:pPr>
-              <a:buFont typeface="Wingdings" panose="05000000000000000000" pitchFamily="2" charset="2"/>
-              <a:buChar char="v"/>
-            </a:pPr>
-            <a:r>
-              <a:rPr lang="en-US" sz="2600" dirty="0"/>
               <a:t> Poster</a:t>
             </a:r>
-            <a:endParaRPr lang="en-US" sz="2600" dirty="0"/>
           </a:p>
         </p:txBody>
       </p:sp>
@@ -6331,8 +6367,13 @@
             </a:pPr>
             <a:r>
               <a:rPr lang="en-US" sz="2000" dirty="0" smtClean="0"/>
-              <a:t>A tool that will show what an image has based on the visual content</a:t>
-            </a:r>
+              <a:t>A tool that will </a:t>
+            </a:r>
+            <a:r>
+              <a:rPr lang="en-US" sz="2000" dirty="0" smtClean="0"/>
+              <a:t>identify the content in an image</a:t>
+            </a:r>
+            <a:endParaRPr lang="en-US" sz="2000" dirty="0" smtClean="0"/>
           </a:p>
           <a:p>
             <a:pPr marL="461963" indent="-461963">
@@ -6357,8 +6398,9 @@
             </a:pPr>
             <a:r>
               <a:rPr lang="en-US" sz="2000" dirty="0" smtClean="0"/>
-              <a:t>Simplification in categorizing the images</a:t>
-            </a:r>
+              <a:t>Categorization of images</a:t>
+            </a:r>
+            <a:endParaRPr lang="en-US" sz="2000" dirty="0" smtClean="0"/>
           </a:p>
           <a:p>
             <a:pPr marL="911225" lvl="1" indent="-450850">
@@ -6370,7 +6412,19 @@
             </a:pPr>
             <a:r>
               <a:rPr lang="en-US" sz="2000" dirty="0" smtClean="0"/>
-              <a:t> Fast searching through images</a:t>
+              <a:t>Simple and f</a:t>
+            </a:r>
+            <a:r>
+              <a:rPr lang="en-US" sz="2000" dirty="0" smtClean="0"/>
+              <a:t>ast </a:t>
+            </a:r>
+            <a:r>
+              <a:rPr lang="en-US" sz="2000" dirty="0" smtClean="0"/>
+              <a:t>searching </a:t>
+            </a:r>
+            <a:r>
+              <a:rPr lang="en-US" sz="2000" dirty="0" smtClean="0"/>
+              <a:t>of specific tags</a:t>
             </a:r>
           </a:p>
           <a:p>
@@ -6383,18 +6437,9 @@
             </a:pPr>
             <a:r>
               <a:rPr lang="en-US" sz="2000" dirty="0" smtClean="0"/>
-              <a:t>It’s really cool!!!</a:t>
-            </a:r>
-          </a:p>
-          <a:p>
-            <a:pPr lvl="1">
-              <a:lnSpc>
-                <a:spcPct val="100000"/>
-              </a:lnSpc>
-              <a:buFont typeface="Wingdings" charset="2"/>
-              <a:buChar char="Ø"/>
-            </a:pPr>
-            <a:endParaRPr lang="en-US" sz="2000" dirty="0"/>
+              <a:t>Teaching AI to “see”</a:t>
+            </a:r>
+            <a:endParaRPr lang="en-US" sz="2000" dirty="0" smtClean="0"/>
           </a:p>
         </p:txBody>
       </p:sp>
@@ -6526,15 +6571,7 @@
             </a:pPr>
             <a:r>
               <a:rPr lang="en-US" sz="1900" dirty="0"/>
-              <a:t>~300,000 </a:t>
-            </a:r>
-            <a:r>
-              <a:rPr lang="en-US" sz="1900" dirty="0"/>
-              <a:t>images were </a:t>
-            </a:r>
-            <a:r>
-              <a:rPr lang="en-US" sz="1900" dirty="0"/>
-              <a:t>downloaded</a:t>
+              <a:t>~300,000 images were downloaded</a:t>
             </a:r>
           </a:p>
           <a:p>
@@ -6549,7 +6586,6 @@
               <a:rPr lang="en-US" sz="1900" dirty="0"/>
               <a:t>Small subset was used due to computational limitation</a:t>
             </a:r>
-            <a:endParaRPr lang="en-US" sz="1900" dirty="0"/>
           </a:p>
           <a:p>
             <a:pPr marL="475488" lvl="2" indent="0">
@@ -6596,7 +6632,11 @@
             </a:pPr>
             <a:r>
               <a:rPr lang="en-US" sz="1800" dirty="0"/>
-              <a:t>File was divided in two different files, because traditional processing was hard on such a large file</a:t>
+              <a:t>File </a:t>
+            </a:r>
+            <a:r>
+              <a:rPr lang="en-US" sz="1800" dirty="0" smtClean="0"/>
+              <a:t>is divided into two separate files</a:t>
             </a:r>
           </a:p>
           <a:p>
@@ -6608,9 +6648,10 @@
               <a:buChar char="ü"/>
             </a:pPr>
             <a:r>
-              <a:rPr lang="en-US" sz="1800" dirty="0"/>
-              <a:t>Index column was changed to auto-tags, now all the auto-tags are associated with the image ID</a:t>
-            </a:r>
+              <a:rPr lang="en-US" sz="1800" dirty="0" smtClean="0"/>
+              <a:t>Tags are then associated with a list of image IDs</a:t>
+            </a:r>
+            <a:endParaRPr lang="en-US" sz="1800" dirty="0"/>
           </a:p>
           <a:p>
             <a:pPr marL="292608" lvl="1" indent="0">
@@ -7175,11 +7216,7 @@
             </a:pPr>
             <a:r>
               <a:rPr lang="en-US" sz="2000" dirty="0" smtClean="0"/>
-              <a:t>	Clusters </a:t>
-            </a:r>
-            <a:r>
-              <a:rPr lang="en-US" sz="2000" dirty="0" smtClean="0"/>
-              <a:t>data points based on density</a:t>
+              <a:t>	Clusters data points based on density</a:t>
             </a:r>
             <a:endParaRPr lang="en-US" sz="2000" dirty="0"/>
           </a:p>

</xml_diff>